<commit_message>
220701 hj: css update
</commit_message>
<xml_diff>
--- a/기획/카드이미지.pptx
+++ b/기획/카드이미지.pptx
@@ -104,6 +104,11 @@
       </a:defRPr>
     </a:lvl9pPr>
   </p:defaultTextStyle>
+  <p:extLst>
+    <p:ext uri="{EFAFB233-063F-42B5-8137-9DF3F51BA10A}">
+      <p15:sldGuideLst xmlns:p15="http://schemas.microsoft.com/office/powerpoint/2012/main"/>
+    </p:ext>
+  </p:extLst>
 </p:presentation>
 </file>
 
@@ -254,7 +259,7 @@
           <a:p>
             <a:fld id="{A8BBDFCB-BF20-4061-BF95-37C67081546E}" type="datetimeFigureOut">
               <a:rPr lang="ko-KR" altLang="en-US" smtClean="0"/>
-              <a:t>2022-06-30</a:t>
+              <a:t>2022-07-01</a:t>
             </a:fld>
             <a:endParaRPr lang="ko-KR" altLang="en-US"/>
           </a:p>
@@ -452,7 +457,7 @@
           <a:p>
             <a:fld id="{A8BBDFCB-BF20-4061-BF95-37C67081546E}" type="datetimeFigureOut">
               <a:rPr lang="ko-KR" altLang="en-US" smtClean="0"/>
-              <a:t>2022-06-30</a:t>
+              <a:t>2022-07-01</a:t>
             </a:fld>
             <a:endParaRPr lang="ko-KR" altLang="en-US"/>
           </a:p>
@@ -660,7 +665,7 @@
           <a:p>
             <a:fld id="{A8BBDFCB-BF20-4061-BF95-37C67081546E}" type="datetimeFigureOut">
               <a:rPr lang="ko-KR" altLang="en-US" smtClean="0"/>
-              <a:t>2022-06-30</a:t>
+              <a:t>2022-07-01</a:t>
             </a:fld>
             <a:endParaRPr lang="ko-KR" altLang="en-US"/>
           </a:p>
@@ -858,7 +863,7 @@
           <a:p>
             <a:fld id="{A8BBDFCB-BF20-4061-BF95-37C67081546E}" type="datetimeFigureOut">
               <a:rPr lang="ko-KR" altLang="en-US" smtClean="0"/>
-              <a:t>2022-06-30</a:t>
+              <a:t>2022-07-01</a:t>
             </a:fld>
             <a:endParaRPr lang="ko-KR" altLang="en-US"/>
           </a:p>
@@ -1133,7 +1138,7 @@
           <a:p>
             <a:fld id="{A8BBDFCB-BF20-4061-BF95-37C67081546E}" type="datetimeFigureOut">
               <a:rPr lang="ko-KR" altLang="en-US" smtClean="0"/>
-              <a:t>2022-06-30</a:t>
+              <a:t>2022-07-01</a:t>
             </a:fld>
             <a:endParaRPr lang="ko-KR" altLang="en-US"/>
           </a:p>
@@ -1398,7 +1403,7 @@
           <a:p>
             <a:fld id="{A8BBDFCB-BF20-4061-BF95-37C67081546E}" type="datetimeFigureOut">
               <a:rPr lang="ko-KR" altLang="en-US" smtClean="0"/>
-              <a:t>2022-06-30</a:t>
+              <a:t>2022-07-01</a:t>
             </a:fld>
             <a:endParaRPr lang="ko-KR" altLang="en-US"/>
           </a:p>
@@ -1810,7 +1815,7 @@
           <a:p>
             <a:fld id="{A8BBDFCB-BF20-4061-BF95-37C67081546E}" type="datetimeFigureOut">
               <a:rPr lang="ko-KR" altLang="en-US" smtClean="0"/>
-              <a:t>2022-06-30</a:t>
+              <a:t>2022-07-01</a:t>
             </a:fld>
             <a:endParaRPr lang="ko-KR" altLang="en-US"/>
           </a:p>
@@ -1951,7 +1956,7 @@
           <a:p>
             <a:fld id="{A8BBDFCB-BF20-4061-BF95-37C67081546E}" type="datetimeFigureOut">
               <a:rPr lang="ko-KR" altLang="en-US" smtClean="0"/>
-              <a:t>2022-06-30</a:t>
+              <a:t>2022-07-01</a:t>
             </a:fld>
             <a:endParaRPr lang="ko-KR" altLang="en-US"/>
           </a:p>
@@ -2064,7 +2069,7 @@
           <a:p>
             <a:fld id="{A8BBDFCB-BF20-4061-BF95-37C67081546E}" type="datetimeFigureOut">
               <a:rPr lang="ko-KR" altLang="en-US" smtClean="0"/>
-              <a:t>2022-06-30</a:t>
+              <a:t>2022-07-01</a:t>
             </a:fld>
             <a:endParaRPr lang="ko-KR" altLang="en-US"/>
           </a:p>
@@ -2375,7 +2380,7 @@
           <a:p>
             <a:fld id="{A8BBDFCB-BF20-4061-BF95-37C67081546E}" type="datetimeFigureOut">
               <a:rPr lang="ko-KR" altLang="en-US" smtClean="0"/>
-              <a:t>2022-06-30</a:t>
+              <a:t>2022-07-01</a:t>
             </a:fld>
             <a:endParaRPr lang="ko-KR" altLang="en-US"/>
           </a:p>
@@ -2663,7 +2668,7 @@
           <a:p>
             <a:fld id="{A8BBDFCB-BF20-4061-BF95-37C67081546E}" type="datetimeFigureOut">
               <a:rPr lang="ko-KR" altLang="en-US" smtClean="0"/>
-              <a:t>2022-06-30</a:t>
+              <a:t>2022-07-01</a:t>
             </a:fld>
             <a:endParaRPr lang="ko-KR" altLang="en-US"/>
           </a:p>
@@ -2904,7 +2909,7 @@
           <a:p>
             <a:fld id="{A8BBDFCB-BF20-4061-BF95-37C67081546E}" type="datetimeFigureOut">
               <a:rPr lang="ko-KR" altLang="en-US" smtClean="0"/>
-              <a:t>2022-06-30</a:t>
+              <a:t>2022-07-01</a:t>
             </a:fld>
             <a:endParaRPr lang="ko-KR" altLang="en-US"/>
           </a:p>
@@ -3335,8 +3340,8 @@
         </p:nvSpPr>
         <p:spPr>
           <a:xfrm>
-            <a:off x="2676089" y="570452"/>
-            <a:ext cx="3137482" cy="4781724"/>
+            <a:off x="2883159" y="2397967"/>
+            <a:ext cx="2780523" cy="2985796"/>
           </a:xfrm>
           <a:prstGeom prst="roundRect">
             <a:avLst>
@@ -3344,8 +3349,9 @@
             </a:avLst>
           </a:prstGeom>
           <a:solidFill>
-            <a:schemeClr val="bg2">
-              <a:lumMod val="90000"/>
+            <a:schemeClr val="accent2">
+              <a:lumMod val="40000"/>
+              <a:lumOff val="60000"/>
             </a:schemeClr>
           </a:solidFill>
           <a:ln>
@@ -3358,6 +3364,13 @@
               </a:prstClr>
             </a:outerShdw>
           </a:effectLst>
+          <a:scene3d>
+            <a:camera prst="orthographicFront"/>
+            <a:lightRig rig="threePt" dir="t"/>
+          </a:scene3d>
+          <a:sp3d>
+            <a:bevelT w="114300" prst="artDeco"/>
+          </a:sp3d>
         </p:spPr>
         <p:style>
           <a:lnRef idx="2">
@@ -3398,48 +3411,40 @@
         </p:nvSpPr>
         <p:spPr>
           <a:xfrm>
-            <a:off x="2828489" y="722852"/>
-            <a:ext cx="2842469" cy="4461544"/>
+            <a:off x="3088432" y="2668555"/>
+            <a:ext cx="2341983" cy="2515840"/>
           </a:xfrm>
           <a:prstGeom prst="roundRect">
             <a:avLst>
               <a:gd name="adj" fmla="val 10785"/>
             </a:avLst>
           </a:prstGeom>
-          <a:blipFill dpi="0" rotWithShape="1">
-            <a:blip r:embed="rId2">
-              <a:alphaModFix amt="60000"/>
-              <a:extLst>
-                <a:ext uri="{28A0092B-C50C-407E-A947-70E740481C1C}">
-                  <a14:useLocalDpi xmlns:a14="http://schemas.microsoft.com/office/drawing/2010/main" val="0"/>
-                </a:ext>
-              </a:extLst>
-            </a:blip>
-            <a:srcRect/>
-            <a:stretch>
-              <a:fillRect/>
-            </a:stretch>
-          </a:blipFill>
+          <a:solidFill>
+            <a:schemeClr val="bg1"/>
+          </a:solidFill>
           <a:ln>
-            <a:solidFill>
-              <a:srgbClr val="FFC000"/>
-            </a:solidFill>
+            <a:noFill/>
           </a:ln>
+          <a:scene3d>
+            <a:camera prst="orthographicFront"/>
+            <a:lightRig rig="threePt" dir="t"/>
+          </a:scene3d>
+          <a:sp3d>
+            <a:bevelT w="114300" prst="hardEdge"/>
+          </a:sp3d>
         </p:spPr>
         <p:style>
-          <a:lnRef idx="2">
-            <a:schemeClr val="accent1">
-              <a:shade val="50000"/>
-            </a:schemeClr>
+          <a:lnRef idx="1">
+            <a:schemeClr val="accent4"/>
           </a:lnRef>
-          <a:fillRef idx="1">
-            <a:schemeClr val="accent1"/>
+          <a:fillRef idx="2">
+            <a:schemeClr val="accent4"/>
           </a:fillRef>
-          <a:effectRef idx="0">
-            <a:schemeClr val="accent1"/>
+          <a:effectRef idx="1">
+            <a:schemeClr val="accent4"/>
           </a:effectRef>
           <a:fontRef idx="minor">
-            <a:schemeClr val="lt1"/>
+            <a:schemeClr val="dk1"/>
           </a:fontRef>
         </p:style>
         <p:txBody>
@@ -3453,10 +3458,10 @@
       </p:sp>
       <p:grpSp>
         <p:nvGrpSpPr>
-          <p:cNvPr id="18" name="그룹 17">
-            <a:extLst>
-              <a:ext uri="{FF2B5EF4-FFF2-40B4-BE49-F238E27FC236}">
-                <a16:creationId xmlns:a16="http://schemas.microsoft.com/office/drawing/2014/main" id="{117E656E-869A-149B-9F7C-74351D7224E2}"/>
+          <p:cNvPr id="36" name="그룹 35">
+            <a:extLst>
+              <a:ext uri="{FF2B5EF4-FFF2-40B4-BE49-F238E27FC236}">
+                <a16:creationId xmlns:a16="http://schemas.microsoft.com/office/drawing/2014/main" id="{DE07763B-09EC-B85C-D436-CEA564F1443F}"/>
               </a:ext>
             </a:extLst>
           </p:cNvPr>
@@ -3465,21 +3470,18 @@
         </p:nvGrpSpPr>
         <p:grpSpPr>
           <a:xfrm>
-            <a:off x="2300699" y="248874"/>
-            <a:ext cx="974557" cy="933119"/>
-            <a:chOff x="2300699" y="248874"/>
-            <a:chExt cx="974557" cy="933119"/>
+            <a:off x="3685592" y="3312367"/>
+            <a:ext cx="1154004" cy="1872028"/>
+            <a:chOff x="3562380" y="2769948"/>
+            <a:chExt cx="1417176" cy="2451772"/>
           </a:xfrm>
-          <a:solidFill>
-            <a:srgbClr val="FFC000"/>
-          </a:solidFill>
         </p:grpSpPr>
         <p:sp>
           <p:nvSpPr>
-            <p:cNvPr id="16" name="부분 원형 15">
+            <p:cNvPr id="31" name="자유형: 도형 30">
               <a:extLst>
                 <a:ext uri="{FF2B5EF4-FFF2-40B4-BE49-F238E27FC236}">
-                  <a16:creationId xmlns:a16="http://schemas.microsoft.com/office/drawing/2014/main" id="{825429E3-DF99-8048-EF61-F7A002F03831}"/>
+                  <a16:creationId xmlns:a16="http://schemas.microsoft.com/office/drawing/2014/main" id="{9E30273E-2B5D-2EB9-49E3-9C5F5E0070C3}"/>
                 </a:ext>
               </a:extLst>
             </p:cNvPr>
@@ -3488,21 +3490,294 @@
           </p:nvSpPr>
           <p:spPr>
             <a:xfrm>
-              <a:off x="2300699" y="248874"/>
-              <a:ext cx="968212" cy="914400"/>
+              <a:off x="3677460" y="4010606"/>
+              <a:ext cx="1181846" cy="1211114"/>
             </a:xfrm>
-            <a:prstGeom prst="pie">
-              <a:avLst>
-                <a:gd name="adj1" fmla="val 0"/>
-                <a:gd name="adj2" fmla="val 5400000"/>
-              </a:avLst>
+            <a:custGeom>
+              <a:avLst/>
+              <a:gdLst>
+                <a:gd name="connsiteX0" fmla="*/ 850485 w 1110340"/>
+                <a:gd name="connsiteY0" fmla="*/ 742635 h 1451158"/>
+                <a:gd name="connsiteX1" fmla="*/ 842865 w 1110340"/>
+                <a:gd name="connsiteY1" fmla="*/ 750255 h 1451158"/>
+                <a:gd name="connsiteX2" fmla="*/ 842865 w 1110340"/>
+                <a:gd name="connsiteY2" fmla="*/ 1437316 h 1451158"/>
+                <a:gd name="connsiteX3" fmla="*/ 850485 w 1110340"/>
+                <a:gd name="connsiteY3" fmla="*/ 1444936 h 1451158"/>
+                <a:gd name="connsiteX4" fmla="*/ 880964 w 1110340"/>
+                <a:gd name="connsiteY4" fmla="*/ 1444936 h 1451158"/>
+                <a:gd name="connsiteX5" fmla="*/ 888584 w 1110340"/>
+                <a:gd name="connsiteY5" fmla="*/ 1437316 h 1451158"/>
+                <a:gd name="connsiteX6" fmla="*/ 888584 w 1110340"/>
+                <a:gd name="connsiteY6" fmla="*/ 750255 h 1451158"/>
+                <a:gd name="connsiteX7" fmla="*/ 880964 w 1110340"/>
+                <a:gd name="connsiteY7" fmla="*/ 742635 h 1451158"/>
+                <a:gd name="connsiteX8" fmla="*/ 555170 w 1110340"/>
+                <a:gd name="connsiteY8" fmla="*/ 0 h 1451158"/>
+                <a:gd name="connsiteX9" fmla="*/ 1110340 w 1110340"/>
+                <a:gd name="connsiteY9" fmla="*/ 725579 h 1451158"/>
+                <a:gd name="connsiteX10" fmla="*/ 1110340 w 1110340"/>
+                <a:gd name="connsiteY10" fmla="*/ 1451158 h 1451158"/>
+                <a:gd name="connsiteX11" fmla="*/ 271365 w 1110340"/>
+                <a:gd name="connsiteY11" fmla="*/ 1451158 h 1451158"/>
+                <a:gd name="connsiteX12" fmla="*/ 278985 w 1110340"/>
+                <a:gd name="connsiteY12" fmla="*/ 1443538 h 1451158"/>
+                <a:gd name="connsiteX13" fmla="*/ 278985 w 1110340"/>
+                <a:gd name="connsiteY13" fmla="*/ 756477 h 1451158"/>
+                <a:gd name="connsiteX14" fmla="*/ 271365 w 1110340"/>
+                <a:gd name="connsiteY14" fmla="*/ 748857 h 1451158"/>
+                <a:gd name="connsiteX15" fmla="*/ 240886 w 1110340"/>
+                <a:gd name="connsiteY15" fmla="*/ 748857 h 1451158"/>
+                <a:gd name="connsiteX16" fmla="*/ 233266 w 1110340"/>
+                <a:gd name="connsiteY16" fmla="*/ 756477 h 1451158"/>
+                <a:gd name="connsiteX17" fmla="*/ 233266 w 1110340"/>
+                <a:gd name="connsiteY17" fmla="*/ 1443538 h 1451158"/>
+                <a:gd name="connsiteX18" fmla="*/ 240886 w 1110340"/>
+                <a:gd name="connsiteY18" fmla="*/ 1451158 h 1451158"/>
+                <a:gd name="connsiteX19" fmla="*/ 0 w 1110340"/>
+                <a:gd name="connsiteY19" fmla="*/ 1451158 h 1451158"/>
+                <a:gd name="connsiteX20" fmla="*/ 0 w 1110340"/>
+                <a:gd name="connsiteY20" fmla="*/ 725579 h 1451158"/>
+                <a:gd name="connsiteX21" fmla="*/ 555170 w 1110340"/>
+                <a:gd name="connsiteY21" fmla="*/ 0 h 1451158"/>
+              </a:gdLst>
+              <a:ahLst/>
+              <a:cxnLst>
+                <a:cxn ang="0">
+                  <a:pos x="connsiteX0" y="connsiteY0"/>
+                </a:cxn>
+                <a:cxn ang="0">
+                  <a:pos x="connsiteX1" y="connsiteY1"/>
+                </a:cxn>
+                <a:cxn ang="0">
+                  <a:pos x="connsiteX2" y="connsiteY2"/>
+                </a:cxn>
+                <a:cxn ang="0">
+                  <a:pos x="connsiteX3" y="connsiteY3"/>
+                </a:cxn>
+                <a:cxn ang="0">
+                  <a:pos x="connsiteX4" y="connsiteY4"/>
+                </a:cxn>
+                <a:cxn ang="0">
+                  <a:pos x="connsiteX5" y="connsiteY5"/>
+                </a:cxn>
+                <a:cxn ang="0">
+                  <a:pos x="connsiteX6" y="connsiteY6"/>
+                </a:cxn>
+                <a:cxn ang="0">
+                  <a:pos x="connsiteX7" y="connsiteY7"/>
+                </a:cxn>
+                <a:cxn ang="0">
+                  <a:pos x="connsiteX8" y="connsiteY8"/>
+                </a:cxn>
+                <a:cxn ang="0">
+                  <a:pos x="connsiteX9" y="connsiteY9"/>
+                </a:cxn>
+                <a:cxn ang="0">
+                  <a:pos x="connsiteX10" y="connsiteY10"/>
+                </a:cxn>
+                <a:cxn ang="0">
+                  <a:pos x="connsiteX11" y="connsiteY11"/>
+                </a:cxn>
+                <a:cxn ang="0">
+                  <a:pos x="connsiteX12" y="connsiteY12"/>
+                </a:cxn>
+                <a:cxn ang="0">
+                  <a:pos x="connsiteX13" y="connsiteY13"/>
+                </a:cxn>
+                <a:cxn ang="0">
+                  <a:pos x="connsiteX14" y="connsiteY14"/>
+                </a:cxn>
+                <a:cxn ang="0">
+                  <a:pos x="connsiteX15" y="connsiteY15"/>
+                </a:cxn>
+                <a:cxn ang="0">
+                  <a:pos x="connsiteX16" y="connsiteY16"/>
+                </a:cxn>
+                <a:cxn ang="0">
+                  <a:pos x="connsiteX17" y="connsiteY17"/>
+                </a:cxn>
+                <a:cxn ang="0">
+                  <a:pos x="connsiteX18" y="connsiteY18"/>
+                </a:cxn>
+                <a:cxn ang="0">
+                  <a:pos x="connsiteX19" y="connsiteY19"/>
+                </a:cxn>
+                <a:cxn ang="0">
+                  <a:pos x="connsiteX20" y="connsiteY20"/>
+                </a:cxn>
+                <a:cxn ang="0">
+                  <a:pos x="connsiteX21" y="connsiteY21"/>
+                </a:cxn>
+              </a:cxnLst>
+              <a:rect l="l" t="t" r="r" b="b"/>
+              <a:pathLst>
+                <a:path w="1110340" h="1451158">
+                  <a:moveTo>
+                    <a:pt x="850485" y="742635"/>
+                  </a:moveTo>
+                  <a:cubicBezTo>
+                    <a:pt x="846277" y="742635"/>
+                    <a:pt x="842865" y="746047"/>
+                    <a:pt x="842865" y="750255"/>
+                  </a:cubicBezTo>
+                  <a:lnTo>
+                    <a:pt x="842865" y="1437316"/>
+                  </a:lnTo>
+                  <a:cubicBezTo>
+                    <a:pt x="842865" y="1441524"/>
+                    <a:pt x="846277" y="1444936"/>
+                    <a:pt x="850485" y="1444936"/>
+                  </a:cubicBezTo>
+                  <a:lnTo>
+                    <a:pt x="880964" y="1444936"/>
+                  </a:lnTo>
+                  <a:cubicBezTo>
+                    <a:pt x="885172" y="1444936"/>
+                    <a:pt x="888584" y="1441524"/>
+                    <a:pt x="888584" y="1437316"/>
+                  </a:cubicBezTo>
+                  <a:lnTo>
+                    <a:pt x="888584" y="750255"/>
+                  </a:lnTo>
+                  <a:cubicBezTo>
+                    <a:pt x="888584" y="746047"/>
+                    <a:pt x="885172" y="742635"/>
+                    <a:pt x="880964" y="742635"/>
+                  </a:cubicBezTo>
+                  <a:close/>
+                  <a:moveTo>
+                    <a:pt x="555170" y="0"/>
+                  </a:moveTo>
+                  <a:cubicBezTo>
+                    <a:pt x="861782" y="0"/>
+                    <a:pt x="1110340" y="324853"/>
+                    <a:pt x="1110340" y="725579"/>
+                  </a:cubicBezTo>
+                  <a:lnTo>
+                    <a:pt x="1110340" y="1451158"/>
+                  </a:lnTo>
+                  <a:lnTo>
+                    <a:pt x="271365" y="1451158"/>
+                  </a:lnTo>
+                  <a:cubicBezTo>
+                    <a:pt x="275573" y="1451158"/>
+                    <a:pt x="278985" y="1447746"/>
+                    <a:pt x="278985" y="1443538"/>
+                  </a:cubicBezTo>
+                  <a:lnTo>
+                    <a:pt x="278985" y="756477"/>
+                  </a:lnTo>
+                  <a:cubicBezTo>
+                    <a:pt x="278985" y="752269"/>
+                    <a:pt x="275573" y="748857"/>
+                    <a:pt x="271365" y="748857"/>
+                  </a:cubicBezTo>
+                  <a:lnTo>
+                    <a:pt x="240886" y="748857"/>
+                  </a:lnTo>
+                  <a:cubicBezTo>
+                    <a:pt x="236678" y="748857"/>
+                    <a:pt x="233266" y="752269"/>
+                    <a:pt x="233266" y="756477"/>
+                  </a:cubicBezTo>
+                  <a:lnTo>
+                    <a:pt x="233266" y="1443538"/>
+                  </a:lnTo>
+                  <a:cubicBezTo>
+                    <a:pt x="233266" y="1447746"/>
+                    <a:pt x="236678" y="1451158"/>
+                    <a:pt x="240886" y="1451158"/>
+                  </a:cubicBezTo>
+                  <a:lnTo>
+                    <a:pt x="0" y="1451158"/>
+                  </a:lnTo>
+                  <a:lnTo>
+                    <a:pt x="0" y="725579"/>
+                  </a:lnTo>
+                  <a:cubicBezTo>
+                    <a:pt x="0" y="324853"/>
+                    <a:pt x="248558" y="0"/>
+                    <a:pt x="555170" y="0"/>
+                  </a:cubicBezTo>
+                  <a:close/>
+                </a:path>
+              </a:pathLst>
+            </a:custGeom>
+            <a:solidFill>
+              <a:srgbClr val="CB3D70"/>
+            </a:solidFill>
+            <a:ln>
+              <a:noFill/>
+            </a:ln>
+            <a:scene3d>
+              <a:camera prst="orthographicFront"/>
+              <a:lightRig rig="threePt" dir="t"/>
+            </a:scene3d>
+            <a:sp3d>
+              <a:bevelT/>
+            </a:sp3d>
+          </p:spPr>
+          <p:style>
+            <a:lnRef idx="2">
+              <a:schemeClr val="accent1">
+                <a:shade val="50000"/>
+              </a:schemeClr>
+            </a:lnRef>
+            <a:fillRef idx="1">
+              <a:schemeClr val="accent1"/>
+            </a:fillRef>
+            <a:effectRef idx="0">
+              <a:schemeClr val="accent1"/>
+            </a:effectRef>
+            <a:fontRef idx="minor">
+              <a:schemeClr val="lt1"/>
+            </a:fontRef>
+          </p:style>
+          <p:txBody>
+            <a:bodyPr wrap="square" rtlCol="0" anchor="ctr">
+              <a:noAutofit/>
+            </a:bodyPr>
+            <a:lstStyle/>
+            <a:p>
+              <a:pPr algn="ctr"/>
+              <a:endParaRPr lang="ko-KR" altLang="en-US" dirty="0"/>
+            </a:p>
+          </p:txBody>
+        </p:sp>
+        <p:sp>
+          <p:nvSpPr>
+            <p:cNvPr id="7" name="타원 6">
+              <a:extLst>
+                <a:ext uri="{FF2B5EF4-FFF2-40B4-BE49-F238E27FC236}">
+                  <a16:creationId xmlns:a16="http://schemas.microsoft.com/office/drawing/2014/main" id="{F72087CF-1825-AF9A-C2D3-D5B0D6F99A0C}"/>
+                </a:ext>
+              </a:extLst>
+            </p:cNvPr>
+            <p:cNvSpPr/>
+            <p:nvPr/>
+          </p:nvSpPr>
+          <p:spPr>
+            <a:xfrm>
+              <a:off x="3562380" y="2769948"/>
+              <a:ext cx="1417176" cy="1377507"/>
+            </a:xfrm>
+            <a:prstGeom prst="ellipse">
+              <a:avLst/>
             </a:prstGeom>
-            <a:grpFill/>
+            <a:solidFill>
+              <a:srgbClr val="CB3D70"/>
+            </a:solidFill>
             <a:ln>
-              <a:solidFill>
-                <a:srgbClr val="FFC000"/>
-              </a:solidFill>
+              <a:noFill/>
             </a:ln>
+            <a:scene3d>
+              <a:camera prst="orthographicFront"/>
+              <a:lightRig rig="threePt" dir="t"/>
+            </a:scene3d>
+            <a:sp3d>
+              <a:bevelT/>
+            </a:sp3d>
           </p:spPr>
           <p:style>
             <a:lnRef idx="2">
@@ -3525,97 +3800,16 @@
             <a:lstStyle/>
             <a:p>
               <a:pPr algn="ctr"/>
-              <a:endParaRPr lang="ko-KR" altLang="en-US" dirty="0">
-                <a:solidFill>
-                  <a:schemeClr val="tx1"/>
-                </a:solidFill>
-              </a:endParaRPr>
+              <a:endParaRPr lang="ko-KR" altLang="en-US"/>
             </a:p>
           </p:txBody>
         </p:sp>
         <p:sp>
           <p:nvSpPr>
-            <p:cNvPr id="17" name="원호 16">
+            <p:cNvPr id="11" name="직사각형 10">
               <a:extLst>
                 <a:ext uri="{FF2B5EF4-FFF2-40B4-BE49-F238E27FC236}">
-                  <a16:creationId xmlns:a16="http://schemas.microsoft.com/office/drawing/2014/main" id="{20704630-4A89-4470-DE45-D64489C6DC1F}"/>
-                </a:ext>
-              </a:extLst>
-            </p:cNvPr>
-            <p:cNvSpPr/>
-            <p:nvPr/>
-          </p:nvSpPr>
-          <p:spPr>
-            <a:xfrm rot="7162871">
-              <a:off x="2554534" y="461270"/>
-              <a:ext cx="725662" cy="715783"/>
-            </a:xfrm>
-            <a:prstGeom prst="arc">
-              <a:avLst>
-                <a:gd name="adj1" fmla="val 13508663"/>
-                <a:gd name="adj2" fmla="val 20645904"/>
-              </a:avLst>
-            </a:prstGeom>
-            <a:grpFill/>
-            <a:ln w="12700">
-              <a:solidFill>
-                <a:srgbClr val="FFC000"/>
-              </a:solidFill>
-            </a:ln>
-          </p:spPr>
-          <p:style>
-            <a:lnRef idx="1">
-              <a:schemeClr val="accent1"/>
-            </a:lnRef>
-            <a:fillRef idx="0">
-              <a:schemeClr val="accent1"/>
-            </a:fillRef>
-            <a:effectRef idx="0">
-              <a:schemeClr val="accent1"/>
-            </a:effectRef>
-            <a:fontRef idx="minor">
-              <a:schemeClr val="tx1"/>
-            </a:fontRef>
-          </p:style>
-          <p:txBody>
-            <a:bodyPr rtlCol="0" anchor="ctr"/>
-            <a:lstStyle/>
-            <a:p>
-              <a:pPr algn="ctr"/>
-              <a:endParaRPr lang="ko-KR" altLang="en-US" dirty="0"/>
-            </a:p>
-          </p:txBody>
-        </p:sp>
-      </p:grpSp>
-      <p:grpSp>
-        <p:nvGrpSpPr>
-          <p:cNvPr id="19" name="그룹 18">
-            <a:extLst>
-              <a:ext uri="{FF2B5EF4-FFF2-40B4-BE49-F238E27FC236}">
-                <a16:creationId xmlns:a16="http://schemas.microsoft.com/office/drawing/2014/main" id="{D84F8666-F725-1BD9-6306-EE043800D157}"/>
-              </a:ext>
-            </a:extLst>
-          </p:cNvPr>
-          <p:cNvGrpSpPr/>
-          <p:nvPr/>
-        </p:nvGrpSpPr>
-        <p:grpSpPr>
-          <a:xfrm rot="5400000">
-            <a:off x="5191299" y="209436"/>
-            <a:ext cx="974557" cy="933119"/>
-            <a:chOff x="2300699" y="248874"/>
-            <a:chExt cx="974557" cy="933119"/>
-          </a:xfrm>
-          <a:solidFill>
-            <a:srgbClr val="FFC000"/>
-          </a:solidFill>
-        </p:grpSpPr>
-        <p:sp>
-          <p:nvSpPr>
-            <p:cNvPr id="20" name="부분 원형 19">
-              <a:extLst>
-                <a:ext uri="{FF2B5EF4-FFF2-40B4-BE49-F238E27FC236}">
-                  <a16:creationId xmlns:a16="http://schemas.microsoft.com/office/drawing/2014/main" id="{5AA85BB1-D659-8A64-50F8-C99C71E628EA}"/>
+                  <a16:creationId xmlns:a16="http://schemas.microsoft.com/office/drawing/2014/main" id="{00E45095-7D7D-BC64-6A2A-4931C79BE5AF}"/>
                 </a:ext>
               </a:extLst>
             </p:cNvPr>
@@ -3624,21 +3818,25 @@
           </p:nvSpPr>
           <p:spPr>
             <a:xfrm>
-              <a:off x="2300699" y="248874"/>
-              <a:ext cx="968212" cy="914400"/>
+              <a:off x="4068147" y="4001275"/>
+              <a:ext cx="429208" cy="174173"/>
             </a:xfrm>
-            <a:prstGeom prst="pie">
-              <a:avLst>
-                <a:gd name="adj1" fmla="val 0"/>
-                <a:gd name="adj2" fmla="val 5400000"/>
-              </a:avLst>
+            <a:prstGeom prst="rect">
+              <a:avLst/>
             </a:prstGeom>
-            <a:grpFill/>
+            <a:solidFill>
+              <a:srgbClr val="972950"/>
+            </a:solidFill>
             <a:ln>
-              <a:solidFill>
-                <a:srgbClr val="FFC000"/>
-              </a:solidFill>
+              <a:noFill/>
             </a:ln>
+            <a:scene3d>
+              <a:camera prst="orthographicFront"/>
+              <a:lightRig rig="threePt" dir="t"/>
+            </a:scene3d>
+            <a:sp3d>
+              <a:bevelT/>
+            </a:sp3d>
           </p:spPr>
           <p:style>
             <a:lnRef idx="2">
@@ -3661,97 +3859,16 @@
             <a:lstStyle/>
             <a:p>
               <a:pPr algn="ctr"/>
-              <a:endParaRPr lang="ko-KR" altLang="en-US">
-                <a:solidFill>
-                  <a:schemeClr val="tx1"/>
-                </a:solidFill>
-              </a:endParaRPr>
+              <a:endParaRPr lang="ko-KR" altLang="en-US"/>
             </a:p>
           </p:txBody>
         </p:sp>
         <p:sp>
           <p:nvSpPr>
-            <p:cNvPr id="21" name="원호 20">
+            <p:cNvPr id="29" name="타원 28">
               <a:extLst>
                 <a:ext uri="{FF2B5EF4-FFF2-40B4-BE49-F238E27FC236}">
-                  <a16:creationId xmlns:a16="http://schemas.microsoft.com/office/drawing/2014/main" id="{DDD8CA73-11CA-8640-752A-A436844E39AE}"/>
-                </a:ext>
-              </a:extLst>
-            </p:cNvPr>
-            <p:cNvSpPr/>
-            <p:nvPr/>
-          </p:nvSpPr>
-          <p:spPr>
-            <a:xfrm rot="7162871">
-              <a:off x="2554534" y="461270"/>
-              <a:ext cx="725662" cy="715783"/>
-            </a:xfrm>
-            <a:prstGeom prst="arc">
-              <a:avLst>
-                <a:gd name="adj1" fmla="val 13508663"/>
-                <a:gd name="adj2" fmla="val 20645904"/>
-              </a:avLst>
-            </a:prstGeom>
-            <a:grpFill/>
-            <a:ln w="12700">
-              <a:solidFill>
-                <a:srgbClr val="FFC000"/>
-              </a:solidFill>
-            </a:ln>
-          </p:spPr>
-          <p:style>
-            <a:lnRef idx="1">
-              <a:schemeClr val="accent1"/>
-            </a:lnRef>
-            <a:fillRef idx="0">
-              <a:schemeClr val="accent1"/>
-            </a:fillRef>
-            <a:effectRef idx="0">
-              <a:schemeClr val="accent1"/>
-            </a:effectRef>
-            <a:fontRef idx="minor">
-              <a:schemeClr val="tx1"/>
-            </a:fontRef>
-          </p:style>
-          <p:txBody>
-            <a:bodyPr rtlCol="0" anchor="ctr"/>
-            <a:lstStyle/>
-            <a:p>
-              <a:pPr algn="ctr"/>
-              <a:endParaRPr lang="ko-KR" altLang="en-US" dirty="0"/>
-            </a:p>
-          </p:txBody>
-        </p:sp>
-      </p:grpSp>
-      <p:grpSp>
-        <p:nvGrpSpPr>
-          <p:cNvPr id="22" name="그룹 21">
-            <a:extLst>
-              <a:ext uri="{FF2B5EF4-FFF2-40B4-BE49-F238E27FC236}">
-                <a16:creationId xmlns:a16="http://schemas.microsoft.com/office/drawing/2014/main" id="{2AFB91D7-82AF-F4F4-2AC7-C29D90B718B4}"/>
-              </a:ext>
-            </a:extLst>
-          </p:cNvPr>
-          <p:cNvGrpSpPr/>
-          <p:nvPr/>
-        </p:nvGrpSpPr>
-        <p:grpSpPr>
-          <a:xfrm rot="11283866">
-            <a:off x="5156529" y="4757062"/>
-            <a:ext cx="947508" cy="1005003"/>
-            <a:chOff x="2300699" y="248874"/>
-            <a:chExt cx="974557" cy="933119"/>
-          </a:xfrm>
-          <a:solidFill>
-            <a:srgbClr val="FFC000"/>
-          </a:solidFill>
-        </p:grpSpPr>
-        <p:sp>
-          <p:nvSpPr>
-            <p:cNvPr id="23" name="부분 원형 22">
-              <a:extLst>
-                <a:ext uri="{FF2B5EF4-FFF2-40B4-BE49-F238E27FC236}">
-                  <a16:creationId xmlns:a16="http://schemas.microsoft.com/office/drawing/2014/main" id="{13FD5E71-9B23-5699-D1A8-22301B94253A}"/>
+                  <a16:creationId xmlns:a16="http://schemas.microsoft.com/office/drawing/2014/main" id="{F84B70E4-32D7-92FC-ED6A-A0419ACC203B}"/>
                 </a:ext>
               </a:extLst>
             </p:cNvPr>
@@ -3760,21 +3877,25 @@
           </p:nvSpPr>
           <p:spPr>
             <a:xfrm>
-              <a:off x="2300699" y="248874"/>
-              <a:ext cx="968212" cy="914400"/>
+              <a:off x="3640136" y="2857034"/>
+              <a:ext cx="1239775" cy="1211114"/>
             </a:xfrm>
-            <a:prstGeom prst="pie">
-              <a:avLst>
-                <a:gd name="adj1" fmla="val 0"/>
-                <a:gd name="adj2" fmla="val 5400000"/>
-              </a:avLst>
+            <a:prstGeom prst="ellipse">
+              <a:avLst/>
             </a:prstGeom>
-            <a:grpFill/>
+            <a:solidFill>
+              <a:schemeClr val="tx1"/>
+            </a:solidFill>
             <a:ln>
-              <a:solidFill>
-                <a:srgbClr val="FFC000"/>
-              </a:solidFill>
+              <a:noFill/>
             </a:ln>
+            <a:scene3d>
+              <a:camera prst="orthographicFront"/>
+              <a:lightRig rig="threePt" dir="t"/>
+            </a:scene3d>
+            <a:sp3d>
+              <a:bevelT/>
+            </a:sp3d>
           </p:spPr>
           <p:style>
             <a:lnRef idx="2">
@@ -3797,203 +3918,149 @@
             <a:lstStyle/>
             <a:p>
               <a:pPr algn="ctr"/>
-              <a:endParaRPr lang="ko-KR" altLang="en-US">
-                <a:solidFill>
-                  <a:schemeClr val="tx1"/>
-                </a:solidFill>
-              </a:endParaRPr>
-            </a:p>
-          </p:txBody>
-        </p:sp>
-        <p:sp>
-          <p:nvSpPr>
-            <p:cNvPr id="24" name="원호 23">
-              <a:extLst>
-                <a:ext uri="{FF2B5EF4-FFF2-40B4-BE49-F238E27FC236}">
-                  <a16:creationId xmlns:a16="http://schemas.microsoft.com/office/drawing/2014/main" id="{698C8EE0-3FAC-62D7-9FE1-54C775307996}"/>
-                </a:ext>
-              </a:extLst>
-            </p:cNvPr>
-            <p:cNvSpPr/>
-            <p:nvPr/>
-          </p:nvSpPr>
-          <p:spPr>
-            <a:xfrm rot="7162871">
-              <a:off x="2554534" y="461270"/>
-              <a:ext cx="725662" cy="715783"/>
-            </a:xfrm>
-            <a:prstGeom prst="arc">
-              <a:avLst>
-                <a:gd name="adj1" fmla="val 13508663"/>
-                <a:gd name="adj2" fmla="val 20645904"/>
-              </a:avLst>
-            </a:prstGeom>
-            <a:grpFill/>
-            <a:ln w="12700">
-              <a:solidFill>
-                <a:srgbClr val="FFC000"/>
-              </a:solidFill>
-            </a:ln>
-          </p:spPr>
-          <p:style>
-            <a:lnRef idx="1">
-              <a:schemeClr val="accent1"/>
-            </a:lnRef>
-            <a:fillRef idx="0">
-              <a:schemeClr val="accent1"/>
-            </a:fillRef>
-            <a:effectRef idx="0">
-              <a:schemeClr val="accent1"/>
-            </a:effectRef>
-            <a:fontRef idx="minor">
-              <a:schemeClr val="tx1"/>
-            </a:fontRef>
-          </p:style>
-          <p:txBody>
-            <a:bodyPr rtlCol="0" anchor="ctr"/>
-            <a:lstStyle/>
-            <a:p>
-              <a:pPr algn="ctr"/>
               <a:endParaRPr lang="ko-KR" altLang="en-US" dirty="0"/>
             </a:p>
           </p:txBody>
         </p:sp>
-      </p:grpSp>
-      <p:grpSp>
-        <p:nvGrpSpPr>
-          <p:cNvPr id="25" name="그룹 24">
-            <a:extLst>
-              <a:ext uri="{FF2B5EF4-FFF2-40B4-BE49-F238E27FC236}">
-                <a16:creationId xmlns:a16="http://schemas.microsoft.com/office/drawing/2014/main" id="{F984A371-E5A0-52AA-7C27-CB936FE8823E}"/>
-              </a:ext>
-            </a:extLst>
-          </p:cNvPr>
-          <p:cNvGrpSpPr/>
-          <p:nvPr/>
-        </p:nvGrpSpPr>
-        <p:grpSpPr>
-          <a:xfrm rot="16718016">
-            <a:off x="2262452" y="4694721"/>
-            <a:ext cx="974557" cy="933119"/>
-            <a:chOff x="2300699" y="248874"/>
-            <a:chExt cx="974557" cy="933119"/>
-          </a:xfrm>
-          <a:solidFill>
-            <a:srgbClr val="FFC000"/>
-          </a:solidFill>
-        </p:grpSpPr>
-        <p:sp>
-          <p:nvSpPr>
-            <p:cNvPr id="26" name="부분 원형 25">
+        <p:grpSp>
+          <p:nvGrpSpPr>
+            <p:cNvPr id="35" name="그룹 34">
               <a:extLst>
                 <a:ext uri="{FF2B5EF4-FFF2-40B4-BE49-F238E27FC236}">
-                  <a16:creationId xmlns:a16="http://schemas.microsoft.com/office/drawing/2014/main" id="{3B1AC168-8728-C1DA-AFC6-15A3A2A8A211}"/>
+                  <a16:creationId xmlns:a16="http://schemas.microsoft.com/office/drawing/2014/main" id="{54C43F63-55AA-6E4E-02BE-5E3D2A455387}"/>
                 </a:ext>
               </a:extLst>
             </p:cNvPr>
-            <p:cNvSpPr/>
+            <p:cNvGrpSpPr/>
             <p:nvPr/>
-          </p:nvSpPr>
-          <p:spPr>
+          </p:nvGrpSpPr>
+          <p:grpSpPr>
             <a:xfrm>
-              <a:off x="2300699" y="248874"/>
-              <a:ext cx="968212" cy="914400"/>
+              <a:off x="3857610" y="3037638"/>
+              <a:ext cx="811764" cy="651756"/>
+              <a:chOff x="7002624" y="3363292"/>
+              <a:chExt cx="811764" cy="651756"/>
             </a:xfrm>
-            <a:prstGeom prst="pie">
-              <a:avLst>
-                <a:gd name="adj1" fmla="val 0"/>
-                <a:gd name="adj2" fmla="val 5400000"/>
-              </a:avLst>
-            </a:prstGeom>
-            <a:grpFill/>
-            <a:ln>
+          </p:grpSpPr>
+          <p:sp>
+            <p:nvSpPr>
+              <p:cNvPr id="33" name="이등변 삼각형 32">
+                <a:extLst>
+                  <a:ext uri="{FF2B5EF4-FFF2-40B4-BE49-F238E27FC236}">
+                    <a16:creationId xmlns:a16="http://schemas.microsoft.com/office/drawing/2014/main" id="{479B72F0-61AB-0585-9685-6BB4EE3D3FF7}"/>
+                  </a:ext>
+                </a:extLst>
+              </p:cNvPr>
+              <p:cNvSpPr/>
+              <p:nvPr/>
+            </p:nvSpPr>
+            <p:spPr>
+              <a:xfrm>
+                <a:off x="7002624" y="3363292"/>
+                <a:ext cx="811764" cy="651756"/>
+              </a:xfrm>
+              <a:prstGeom prst="triangle">
+                <a:avLst/>
+              </a:prstGeom>
               <a:solidFill>
-                <a:srgbClr val="FFC000"/>
+                <a:srgbClr val="FFFFFF"/>
               </a:solidFill>
-            </a:ln>
-          </p:spPr>
-          <p:style>
-            <a:lnRef idx="2">
-              <a:schemeClr val="accent1">
-                <a:shade val="50000"/>
-              </a:schemeClr>
-            </a:lnRef>
-            <a:fillRef idx="1">
-              <a:schemeClr val="accent1"/>
-            </a:fillRef>
-            <a:effectRef idx="0">
-              <a:schemeClr val="accent1"/>
-            </a:effectRef>
-            <a:fontRef idx="minor">
-              <a:schemeClr val="lt1"/>
-            </a:fontRef>
-          </p:style>
-          <p:txBody>
-            <a:bodyPr rtlCol="0" anchor="ctr"/>
-            <a:lstStyle/>
-            <a:p>
-              <a:pPr algn="ctr"/>
-              <a:endParaRPr lang="ko-KR" altLang="en-US">
-                <a:solidFill>
-                  <a:schemeClr val="tx1"/>
-                </a:solidFill>
-              </a:endParaRPr>
-            </a:p>
-          </p:txBody>
-        </p:sp>
-        <p:sp>
-          <p:nvSpPr>
-            <p:cNvPr id="27" name="원호 26">
-              <a:extLst>
-                <a:ext uri="{FF2B5EF4-FFF2-40B4-BE49-F238E27FC236}">
-                  <a16:creationId xmlns:a16="http://schemas.microsoft.com/office/drawing/2014/main" id="{FA4B7ECE-47B6-4732-9E0B-61CFF0596EB8}"/>
-                </a:ext>
-              </a:extLst>
-            </p:cNvPr>
-            <p:cNvSpPr/>
-            <p:nvPr/>
-          </p:nvSpPr>
-          <p:spPr>
-            <a:xfrm rot="7162871">
-              <a:off x="2554534" y="461270"/>
-              <a:ext cx="725662" cy="715783"/>
-            </a:xfrm>
-            <a:prstGeom prst="arc">
-              <a:avLst>
-                <a:gd name="adj1" fmla="val 13508663"/>
-                <a:gd name="adj2" fmla="val 20645904"/>
-              </a:avLst>
-            </a:prstGeom>
-            <a:grpFill/>
-            <a:ln w="12700">
+              <a:ln>
+                <a:noFill/>
+              </a:ln>
+              <a:scene3d>
+                <a:camera prst="orthographicFront"/>
+                <a:lightRig rig="threePt" dir="t"/>
+              </a:scene3d>
+              <a:sp3d>
+                <a:bevelT w="101600" prst="riblet"/>
+              </a:sp3d>
+            </p:spPr>
+            <p:style>
+              <a:lnRef idx="2">
+                <a:schemeClr val="accent1">
+                  <a:shade val="50000"/>
+                </a:schemeClr>
+              </a:lnRef>
+              <a:fillRef idx="1">
+                <a:schemeClr val="accent1"/>
+              </a:fillRef>
+              <a:effectRef idx="0">
+                <a:schemeClr val="accent1"/>
+              </a:effectRef>
+              <a:fontRef idx="minor">
+                <a:schemeClr val="lt1"/>
+              </a:fontRef>
+            </p:style>
+            <p:txBody>
+              <a:bodyPr rtlCol="0" anchor="ctr"/>
+              <a:lstStyle/>
+              <a:p>
+                <a:pPr algn="ctr"/>
+                <a:endParaRPr lang="ko-KR" altLang="en-US"/>
+              </a:p>
+            </p:txBody>
+          </p:sp>
+          <p:sp>
+            <p:nvSpPr>
+              <p:cNvPr id="34" name="이등변 삼각형 33">
+                <a:extLst>
+                  <a:ext uri="{FF2B5EF4-FFF2-40B4-BE49-F238E27FC236}">
+                    <a16:creationId xmlns:a16="http://schemas.microsoft.com/office/drawing/2014/main" id="{C380CB89-FBBA-F6BD-CFA3-AD1EE6F370EC}"/>
+                  </a:ext>
+                </a:extLst>
+              </p:cNvPr>
+              <p:cNvSpPr/>
+              <p:nvPr/>
+            </p:nvSpPr>
+            <p:spPr>
+              <a:xfrm>
+                <a:off x="7164355" y="3534354"/>
+                <a:ext cx="486747" cy="384504"/>
+              </a:xfrm>
+              <a:prstGeom prst="triangle">
+                <a:avLst/>
+              </a:prstGeom>
               <a:solidFill>
-                <a:srgbClr val="FFC000"/>
+                <a:schemeClr val="tx1"/>
               </a:solidFill>
-            </a:ln>
-          </p:spPr>
-          <p:style>
-            <a:lnRef idx="1">
-              <a:schemeClr val="accent1"/>
-            </a:lnRef>
-            <a:fillRef idx="0">
-              <a:schemeClr val="accent1"/>
-            </a:fillRef>
-            <a:effectRef idx="0">
-              <a:schemeClr val="accent1"/>
-            </a:effectRef>
-            <a:fontRef idx="minor">
-              <a:schemeClr val="tx1"/>
-            </a:fontRef>
-          </p:style>
-          <p:txBody>
-            <a:bodyPr rtlCol="0" anchor="ctr"/>
-            <a:lstStyle/>
-            <a:p>
-              <a:pPr algn="ctr"/>
-              <a:endParaRPr lang="ko-KR" altLang="en-US" dirty="0"/>
-            </a:p>
-          </p:txBody>
-        </p:sp>
+              <a:ln>
+                <a:noFill/>
+              </a:ln>
+              <a:scene3d>
+                <a:camera prst="orthographicFront"/>
+                <a:lightRig rig="threePt" dir="t"/>
+              </a:scene3d>
+              <a:sp3d>
+                <a:bevelT w="101600" prst="riblet"/>
+              </a:sp3d>
+            </p:spPr>
+            <p:style>
+              <a:lnRef idx="2">
+                <a:schemeClr val="accent1">
+                  <a:shade val="50000"/>
+                </a:schemeClr>
+              </a:lnRef>
+              <a:fillRef idx="1">
+                <a:schemeClr val="accent1"/>
+              </a:fillRef>
+              <a:effectRef idx="0">
+                <a:schemeClr val="accent1"/>
+              </a:effectRef>
+              <a:fontRef idx="minor">
+                <a:schemeClr val="lt1"/>
+              </a:fontRef>
+            </p:style>
+            <p:txBody>
+              <a:bodyPr rtlCol="0" anchor="ctr"/>
+              <a:lstStyle/>
+              <a:p>
+                <a:pPr algn="ctr"/>
+                <a:endParaRPr lang="ko-KR" altLang="en-US"/>
+              </a:p>
+            </p:txBody>
+          </p:sp>
+        </p:grpSp>
       </p:grpSp>
     </p:spTree>
     <p:extLst>

</xml_diff>